<commit_message>
final touches on poweer point
</commit_message>
<xml_diff>
--- a/IMDB Pres.pptx
+++ b/IMDB Pres.pptx
@@ -5407,6 +5407,12 @@
           <a:bodyPr/>
           <a:lstStyle/>
           <a:p>
+            <a:r>
+              <a:rPr lang="en-US" dirty="0">
+                <a:hlinkClick r:id="rId2"/>
+              </a:rPr>
+              <a:t>https://public.tableau.com/profile/robert.mclauchlan - !/vizhome/MovieUpdated/FilmCompanyRevBudget</a:t>
+            </a:r>
             <a:endParaRPr lang="en-US" dirty="0"/>
           </a:p>
         </p:txBody>

</xml_diff>